<commit_message>
changed background color of auto-animate and spotlight gifs
</commit_message>
<xml_diff>
--- a/doc/Auto-animate gif.pptx
+++ b/doc/Auto-animate gif.pptx
@@ -9,7 +9,7 @@
     <p:sldId id="274" r:id="rId3"/>
     <p:sldId id="271" r:id="rId4"/>
     <p:sldId id="276" r:id="rId5"/>
-    <p:sldId id="275" r:id="rId6"/>
+    <p:sldId id="278" r:id="rId6"/>
     <p:sldId id="272" r:id="rId7"/>
     <p:sldId id="268" r:id="rId8"/>
   </p:sldIdLst>
@@ -294,7 +294,7 @@
           <a:p>
             <a:fld id="{1C243D36-5217-48BF-A097-7AA0FC8B35E5}" type="datetimeFigureOut">
               <a:rPr lang="en-US" smtClean="0"/>
-              <a:t>12/15/2013</a:t>
+              <a:t>12/23/2013</a:t>
             </a:fld>
             <a:endParaRPr lang="en-US"/>
           </a:p>
@@ -464,7 +464,7 @@
           <a:p>
             <a:fld id="{1C243D36-5217-48BF-A097-7AA0FC8B35E5}" type="datetimeFigureOut">
               <a:rPr lang="en-US" smtClean="0"/>
-              <a:t>12/15/2013</a:t>
+              <a:t>12/23/2013</a:t>
             </a:fld>
             <a:endParaRPr lang="en-US"/>
           </a:p>
@@ -644,7 +644,7 @@
           <a:p>
             <a:fld id="{1C243D36-5217-48BF-A097-7AA0FC8B35E5}" type="datetimeFigureOut">
               <a:rPr lang="en-US" smtClean="0"/>
-              <a:t>12/15/2013</a:t>
+              <a:t>12/23/2013</a:t>
             </a:fld>
             <a:endParaRPr lang="en-US"/>
           </a:p>
@@ -814,7 +814,7 @@
           <a:p>
             <a:fld id="{1C243D36-5217-48BF-A097-7AA0FC8B35E5}" type="datetimeFigureOut">
               <a:rPr lang="en-US" smtClean="0"/>
-              <a:t>12/15/2013</a:t>
+              <a:t>12/23/2013</a:t>
             </a:fld>
             <a:endParaRPr lang="en-US"/>
           </a:p>
@@ -1067,7 +1067,7 @@
           <a:p>
             <a:fld id="{1C243D36-5217-48BF-A097-7AA0FC8B35E5}" type="datetimeFigureOut">
               <a:rPr lang="en-US" smtClean="0"/>
-              <a:t>12/15/2013</a:t>
+              <a:t>12/23/2013</a:t>
             </a:fld>
             <a:endParaRPr lang="en-US"/>
           </a:p>
@@ -1355,7 +1355,7 @@
           <a:p>
             <a:fld id="{1C243D36-5217-48BF-A097-7AA0FC8B35E5}" type="datetimeFigureOut">
               <a:rPr lang="en-US" smtClean="0"/>
-              <a:t>12/15/2013</a:t>
+              <a:t>12/23/2013</a:t>
             </a:fld>
             <a:endParaRPr lang="en-US"/>
           </a:p>
@@ -1782,7 +1782,7 @@
           <a:p>
             <a:fld id="{1C243D36-5217-48BF-A097-7AA0FC8B35E5}" type="datetimeFigureOut">
               <a:rPr lang="en-US" smtClean="0"/>
-              <a:t>12/15/2013</a:t>
+              <a:t>12/23/2013</a:t>
             </a:fld>
             <a:endParaRPr lang="en-US"/>
           </a:p>
@@ -1900,7 +1900,7 @@
           <a:p>
             <a:fld id="{1C243D36-5217-48BF-A097-7AA0FC8B35E5}" type="datetimeFigureOut">
               <a:rPr lang="en-US" smtClean="0"/>
-              <a:t>12/15/2013</a:t>
+              <a:t>12/23/2013</a:t>
             </a:fld>
             <a:endParaRPr lang="en-US"/>
           </a:p>
@@ -1995,7 +1995,7 @@
           <a:p>
             <a:fld id="{1C243D36-5217-48BF-A097-7AA0FC8B35E5}" type="datetimeFigureOut">
               <a:rPr lang="en-US" smtClean="0"/>
-              <a:t>12/15/2013</a:t>
+              <a:t>12/23/2013</a:t>
             </a:fld>
             <a:endParaRPr lang="en-US"/>
           </a:p>
@@ -2272,7 +2272,7 @@
           <a:p>
             <a:fld id="{1C243D36-5217-48BF-A097-7AA0FC8B35E5}" type="datetimeFigureOut">
               <a:rPr lang="en-US" smtClean="0"/>
-              <a:t>12/15/2013</a:t>
+              <a:t>12/23/2013</a:t>
             </a:fld>
             <a:endParaRPr lang="en-US"/>
           </a:p>
@@ -2525,7 +2525,7 @@
           <a:p>
             <a:fld id="{1C243D36-5217-48BF-A097-7AA0FC8B35E5}" type="datetimeFigureOut">
               <a:rPr lang="en-US" smtClean="0"/>
-              <a:t>12/15/2013</a:t>
+              <a:t>12/23/2013</a:t>
             </a:fld>
             <a:endParaRPr lang="en-US"/>
           </a:p>
@@ -2592,10 +2592,7 @@
     <p:bg>
       <p:bgPr>
         <a:solidFill>
-          <a:schemeClr val="accent6">
-            <a:lumMod val="40000"/>
-            <a:lumOff val="60000"/>
-          </a:schemeClr>
+          <a:schemeClr val="bg1"/>
         </a:solidFill>
         <a:effectLst/>
       </p:bgPr>
@@ -2744,7 +2741,7 @@
           <a:p>
             <a:fld id="{1C243D36-5217-48BF-A097-7AA0FC8B35E5}" type="datetimeFigureOut">
               <a:rPr lang="en-US" smtClean="0"/>
-              <a:t>12/15/2013</a:t>
+              <a:t>12/23/2013</a:t>
             </a:fld>
             <a:endParaRPr lang="en-US"/>
           </a:p>
@@ -2824,6 +2821,54 @@
               <a:rPr lang="en-US" smtClean="0"/>
               <a:t>‹#›</a:t>
             </a:fld>
+            <a:endParaRPr lang="en-US"/>
+          </a:p>
+        </p:txBody>
+      </p:sp>
+      <p:sp>
+        <p:nvSpPr>
+          <p:cNvPr id="7" name="Rectangle 6"/>
+          <p:cNvSpPr/>
+          <p:nvPr userDrawn="1"/>
+        </p:nvSpPr>
+        <p:spPr>
+          <a:xfrm>
+            <a:off x="-1" y="0"/>
+            <a:ext cx="3648456" cy="2734056"/>
+          </a:xfrm>
+          <a:prstGeom prst="rect">
+            <a:avLst/>
+          </a:prstGeom>
+          <a:noFill/>
+          <a:ln>
+            <a:solidFill>
+              <a:schemeClr val="bg1">
+                <a:lumMod val="75000"/>
+              </a:schemeClr>
+            </a:solidFill>
+          </a:ln>
+        </p:spPr>
+        <p:style>
+          <a:lnRef idx="2">
+            <a:schemeClr val="accent1">
+              <a:shade val="50000"/>
+            </a:schemeClr>
+          </a:lnRef>
+          <a:fillRef idx="1">
+            <a:schemeClr val="accent1"/>
+          </a:fillRef>
+          <a:effectRef idx="0">
+            <a:schemeClr val="accent1"/>
+          </a:effectRef>
+          <a:fontRef idx="minor">
+            <a:schemeClr val="lt1"/>
+          </a:fontRef>
+        </p:style>
+        <p:txBody>
+          <a:bodyPr rtlCol="0" anchor="ctr"/>
+          <a:lstStyle/>
+          <a:p>
+            <a:pPr algn="ctr"/>
             <a:endParaRPr lang="en-US"/>
           </a:p>
         </p:txBody>
@@ -3134,8 +3179,8 @@
         </p:nvSpPr>
         <p:spPr>
           <a:xfrm>
-            <a:off x="728845" y="0"/>
-            <a:ext cx="2928755" cy="584775"/>
+            <a:off x="1" y="0"/>
+            <a:ext cx="3657600" cy="523220"/>
           </a:xfrm>
           <a:prstGeom prst="rect">
             <a:avLst/>
@@ -3150,16 +3195,30 @@
           <a:p>
             <a:pPr algn="r"/>
             <a:r>
-              <a:rPr lang="en-US" sz="3200" b="1" dirty="0" smtClean="0">
+              <a:rPr lang="en-US" sz="2800" b="1" dirty="0" smtClean="0">
                 <a:solidFill>
-                  <a:schemeClr val="bg1"/>
+                  <a:schemeClr val="accent6">
+                    <a:lumMod val="75000"/>
+                  </a:schemeClr>
                 </a:solidFill>
               </a:rPr>
-              <a:t>Start position</a:t>
-            </a:r>
-            <a:endParaRPr lang="en-US" sz="3200" b="1" dirty="0">
+              <a:t>Specify start </a:t>
+            </a:r>
+            <a:r>
+              <a:rPr lang="en-US" sz="2800" b="1" dirty="0" smtClean="0">
+                <a:solidFill>
+                  <a:schemeClr val="accent6">
+                    <a:lumMod val="75000"/>
+                  </a:schemeClr>
+                </a:solidFill>
+              </a:rPr>
+              <a:t>position</a:t>
+            </a:r>
+            <a:endParaRPr lang="en-US" sz="2800" b="1" dirty="0">
               <a:solidFill>
-                <a:schemeClr val="bg1"/>
+                <a:schemeClr val="accent6">
+                  <a:lumMod val="75000"/>
+                </a:schemeClr>
               </a:solidFill>
             </a:endParaRPr>
           </a:p>
@@ -3328,11 +3387,11 @@
   <p:clrMapOvr>
     <a:masterClrMapping/>
   </p:clrMapOvr>
-  <mc:AlternateContent xmlns:mc="http://schemas.openxmlformats.org/markup-compatibility/2006">
-    <mc:Choice xmlns:p14="http://schemas.microsoft.com/office/powerpoint/2010/main" Requires="p14">
+  <mc:AlternateContent xmlns:mc="http://schemas.openxmlformats.org/markup-compatibility/2006" xmlns:p14="http://schemas.microsoft.com/office/powerpoint/2010/main">
+    <mc:Choice Requires="p14">
       <p:transition p14:dur="0" advTm="1000"/>
     </mc:Choice>
-    <mc:Fallback>
+    <mc:Fallback xmlns="">
       <p:transition advTm="1000"/>
     </mc:Fallback>
   </mc:AlternateContent>
@@ -3543,7 +3602,7 @@
         </p:nvSpPr>
         <p:spPr>
           <a:xfrm>
-            <a:off x="589873" y="1066800"/>
+            <a:off x="1131898" y="1222305"/>
             <a:ext cx="914400" cy="426720"/>
           </a:xfrm>
           <a:prstGeom prst="chevron">
@@ -3594,7 +3653,7 @@
         </p:nvSpPr>
         <p:spPr>
           <a:xfrm>
-            <a:off x="1294724" y="1066800"/>
+            <a:off x="1836749" y="1222305"/>
             <a:ext cx="914400" cy="426720"/>
           </a:xfrm>
           <a:prstGeom prst="chevron">
@@ -3645,7 +3704,7 @@
         </p:nvSpPr>
         <p:spPr>
           <a:xfrm>
-            <a:off x="1966633" y="1066800"/>
+            <a:off x="2508658" y="1222305"/>
             <a:ext cx="914400" cy="426720"/>
           </a:xfrm>
           <a:prstGeom prst="chevron">
@@ -3690,14 +3749,14 @@
       </p:sp>
       <p:sp>
         <p:nvSpPr>
-          <p:cNvPr id="5" name="TextBox 4"/>
+          <p:cNvPr id="6" name="TextBox 5"/>
           <p:cNvSpPr txBox="1"/>
           <p:nvPr/>
         </p:nvSpPr>
         <p:spPr>
           <a:xfrm>
-            <a:off x="838200" y="0"/>
-            <a:ext cx="2819400" cy="584775"/>
+            <a:off x="1" y="0"/>
+            <a:ext cx="3657600" cy="523220"/>
           </a:xfrm>
           <a:prstGeom prst="rect">
             <a:avLst/>
@@ -3712,16 +3771,30 @@
           <a:p>
             <a:pPr algn="r"/>
             <a:r>
-              <a:rPr lang="en-US" sz="3200" b="1" dirty="0" smtClean="0">
+              <a:rPr lang="en-US" sz="2800" b="1" dirty="0" smtClean="0">
                 <a:solidFill>
-                  <a:schemeClr val="bg1"/>
+                  <a:schemeClr val="accent6">
+                    <a:lumMod val="75000"/>
+                  </a:schemeClr>
                 </a:solidFill>
               </a:rPr>
-              <a:t>End position </a:t>
-            </a:r>
-            <a:endParaRPr lang="en-US" sz="3200" b="1" dirty="0">
+              <a:t>Specify end </a:t>
+            </a:r>
+            <a:r>
+              <a:rPr lang="en-US" sz="2800" b="1" dirty="0" smtClean="0">
+                <a:solidFill>
+                  <a:schemeClr val="accent6">
+                    <a:lumMod val="75000"/>
+                  </a:schemeClr>
+                </a:solidFill>
+              </a:rPr>
+              <a:t>position</a:t>
+            </a:r>
+            <a:endParaRPr lang="en-US" sz="2800" b="1" dirty="0">
               <a:solidFill>
-                <a:schemeClr val="bg1"/>
+                <a:schemeClr val="accent6">
+                  <a:lumMod val="75000"/>
+                </a:schemeClr>
               </a:solidFill>
             </a:endParaRPr>
           </a:p>
@@ -4092,45 +4165,6 @@
           </a:p>
         </p:txBody>
       </p:sp>
-      <p:sp>
-        <p:nvSpPr>
-          <p:cNvPr id="5" name="TextBox 4"/>
-          <p:cNvSpPr txBox="1"/>
-          <p:nvPr/>
-        </p:nvSpPr>
-        <p:spPr>
-          <a:xfrm>
-            <a:off x="633076" y="0"/>
-            <a:ext cx="3024524" cy="584775"/>
-          </a:xfrm>
-          <a:prstGeom prst="rect">
-            <a:avLst/>
-          </a:prstGeom>
-          <a:noFill/>
-        </p:spPr>
-        <p:txBody>
-          <a:bodyPr wrap="square" rtlCol="0">
-            <a:spAutoFit/>
-          </a:bodyPr>
-          <a:lstStyle/>
-          <a:p>
-            <a:pPr algn="r"/>
-            <a:r>
-              <a:rPr lang="en-US" sz="3200" b="1" dirty="0" smtClean="0">
-                <a:solidFill>
-                  <a:schemeClr val="bg1"/>
-                </a:solidFill>
-              </a:rPr>
-              <a:t>Start position</a:t>
-            </a:r>
-            <a:endParaRPr lang="en-US" sz="3200" b="1" dirty="0">
-              <a:solidFill>
-                <a:schemeClr val="bg1"/>
-              </a:solidFill>
-            </a:endParaRPr>
-          </a:p>
-        </p:txBody>
-      </p:sp>
     </p:spTree>
     <p:extLst>
       <p:ext uri="{BB962C8B-B14F-4D97-AF65-F5344CB8AC3E}">
@@ -4173,7 +4207,7 @@
       </p:grpSpPr>
       <p:sp>
         <p:nvSpPr>
-          <p:cNvPr id="3" name="Chevron 2"/>
+          <p:cNvPr id="3" name="arrow 1"/>
           <p:cNvSpPr/>
           <p:nvPr/>
         </p:nvSpPr>
@@ -4224,7 +4258,7 @@
       </p:sp>
       <p:sp>
         <p:nvSpPr>
-          <p:cNvPr id="14" name="Chevron 13"/>
+          <p:cNvPr id="14" name="arrow 2"/>
           <p:cNvSpPr/>
           <p:nvPr/>
         </p:nvSpPr>
@@ -4275,7 +4309,7 @@
       </p:sp>
       <p:sp>
         <p:nvSpPr>
-          <p:cNvPr id="15" name="Chevron 14"/>
+          <p:cNvPr id="15" name="arrow 3"/>
           <p:cNvSpPr/>
           <p:nvPr/>
         </p:nvSpPr>
@@ -4326,14 +4360,14 @@
       </p:sp>
       <p:sp>
         <p:nvSpPr>
-          <p:cNvPr id="5" name="TextBox 4"/>
+          <p:cNvPr id="6" name="TextBox 5"/>
           <p:cNvSpPr txBox="1"/>
           <p:nvPr/>
         </p:nvSpPr>
         <p:spPr>
           <a:xfrm>
             <a:off x="633076" y="0"/>
-            <a:ext cx="3024524" cy="584775"/>
+            <a:ext cx="3024524" cy="523220"/>
           </a:xfrm>
           <a:prstGeom prst="rect">
             <a:avLst/>
@@ -4348,16 +4382,20 @@
           <a:p>
             <a:pPr algn="r"/>
             <a:r>
-              <a:rPr lang="en-US" sz="3200" b="1" dirty="0" smtClean="0">
+              <a:rPr lang="en-US" sz="2800" b="1" dirty="0" smtClean="0">
                 <a:solidFill>
-                  <a:schemeClr val="bg1"/>
+                  <a:schemeClr val="accent6">
+                    <a:lumMod val="75000"/>
+                  </a:schemeClr>
                 </a:solidFill>
               </a:rPr>
               <a:t>Auto-animated</a:t>
             </a:r>
-            <a:endParaRPr lang="en-US" sz="3200" b="1" dirty="0">
+            <a:endParaRPr lang="en-US" sz="2800" b="1" dirty="0">
               <a:solidFill>
-                <a:schemeClr val="bg1"/>
+                <a:schemeClr val="accent6">
+                  <a:lumMod val="75000"/>
+                </a:schemeClr>
               </a:solidFill>
             </a:endParaRPr>
           </a:p>
@@ -4373,13 +4411,13 @@
   <p:clrMapOvr>
     <a:masterClrMapping/>
   </p:clrMapOvr>
-  <mc:AlternateContent xmlns:mc="http://schemas.openxmlformats.org/markup-compatibility/2006">
-    <mc:Choice xmlns:p14="http://schemas.microsoft.com/office/powerpoint/2010/main" Requires="p14">
+  <mc:AlternateContent xmlns:mc="http://schemas.openxmlformats.org/markup-compatibility/2006" xmlns:p14="http://schemas.microsoft.com/office/powerpoint/2010/main">
+    <mc:Choice Requires="p14">
       <p:transition spd="med" p14:dur="700" advTm="0">
         <p:fade/>
       </p:transition>
     </mc:Choice>
-    <mc:Fallback>
+    <mc:Fallback xmlns="">
       <p:transition spd="med" advTm="0">
         <p:fade/>
       </p:transition>
@@ -4397,7 +4435,7 @@
 
 <file path=ppt/slides/slide5.xml><?xml version="1.0" encoding="utf-8"?>
 <p:sld xmlns:a="http://schemas.openxmlformats.org/drawingml/2006/main" xmlns:r="http://schemas.openxmlformats.org/officeDocument/2006/relationships" xmlns:p="http://schemas.openxmlformats.org/presentationml/2006/main">
-  <p:cSld name="PPSlide201312151824562610">
+  <p:cSld name="PPSlide201312232259318772">
     <p:spTree>
       <p:nvGrpSpPr>
         <p:cNvPr id="1" name=""/>
@@ -4414,7 +4452,7 @@
       </p:grpSpPr>
       <p:sp>
         <p:nvSpPr>
-          <p:cNvPr id="3" name="Chevron 2"/>
+          <p:cNvPr id="3" name="arrow 1"/>
           <p:cNvSpPr/>
           <p:nvPr/>
         </p:nvSpPr>
@@ -4465,7 +4503,7 @@
       </p:sp>
       <p:sp>
         <p:nvSpPr>
-          <p:cNvPr id="14" name="Chevron 13"/>
+          <p:cNvPr id="14" name="arrow 2"/>
           <p:cNvSpPr/>
           <p:nvPr/>
         </p:nvSpPr>
@@ -4516,7 +4554,7 @@
       </p:sp>
       <p:sp>
         <p:nvSpPr>
-          <p:cNvPr id="15" name="Chevron 14"/>
+          <p:cNvPr id="15" name="arrow 3"/>
           <p:cNvSpPr/>
           <p:nvPr/>
         </p:nvSpPr>
@@ -4567,14 +4605,14 @@
       </p:sp>
       <p:sp>
         <p:nvSpPr>
-          <p:cNvPr id="5" name="TextBox 4"/>
+          <p:cNvPr id="6" name="TextBox 5"/>
           <p:cNvSpPr txBox="1"/>
           <p:nvPr/>
         </p:nvSpPr>
         <p:spPr>
           <a:xfrm>
             <a:off x="633076" y="0"/>
-            <a:ext cx="3024524" cy="584775"/>
+            <a:ext cx="3024524" cy="523220"/>
           </a:xfrm>
           <a:prstGeom prst="rect">
             <a:avLst/>
@@ -4589,16 +4627,20 @@
           <a:p>
             <a:pPr algn="r"/>
             <a:r>
-              <a:rPr lang="en-US" sz="3200" b="1" dirty="0" smtClean="0">
+              <a:rPr lang="en-US" sz="2800" b="1" dirty="0" smtClean="0">
                 <a:solidFill>
-                  <a:schemeClr val="bg1"/>
+                  <a:schemeClr val="accent6">
+                    <a:lumMod val="75000"/>
+                  </a:schemeClr>
                 </a:solidFill>
               </a:rPr>
               <a:t>Auto-animated</a:t>
             </a:r>
-            <a:endParaRPr lang="en-US" sz="3200" b="1" dirty="0">
+            <a:endParaRPr lang="en-US" sz="2800" b="1" dirty="0">
               <a:solidFill>
-                <a:schemeClr val="bg1"/>
+                <a:schemeClr val="accent6">
+                  <a:lumMod val="75000"/>
+                </a:schemeClr>
               </a:solidFill>
             </a:endParaRPr>
           </a:p>
@@ -4606,7 +4648,7 @@
       </p:sp>
       <p:pic>
         <p:nvPicPr>
-          <p:cNvPr id="2" name="PPIndicator201312151824562960"/>
+          <p:cNvPr id="2" name="PPIndicator201312232259321472"/>
           <p:cNvPicPr>
             <a:picLocks/>
           </p:cNvPicPr>
@@ -4637,7 +4679,7 @@
     </p:spTree>
     <p:extLst>
       <p:ext uri="{BB962C8B-B14F-4D97-AF65-F5344CB8AC3E}">
-        <p14:creationId xmlns:p14="http://schemas.microsoft.com/office/powerpoint/2010/main" val="3256754386"/>
+        <p14:creationId xmlns:p14="http://schemas.microsoft.com/office/powerpoint/2010/main" val="2985763152"/>
       </p:ext>
     </p:extLst>
   </p:cSld>
@@ -4717,7 +4759,7 @@
                                     <p:cond delay="0"/>
                                   </p:stCondLst>
                                   <p:childTnLst>
-                                    <p:animMotion origin="layout" path="M 0 0 C 0.04323313 0.0855018 0.04323313 0.0855018 0.08646626 0.1710036 E" pathEditMode="relative" ptsTypes="">
+                                    <p:animMotion origin="layout" path="M 0 0 C 0.1173288 0.1138455 0.1173288 0.1138455 0.2346577 0.2276911 E" pathEditMode="relative" ptsTypes="">
                                       <p:cBhvr>
                                         <p:cTn id="9" dur="500" fill="hold"/>
                                         <p:tgtEl>
@@ -4758,7 +4800,7 @@
                                     <p:cond delay="0"/>
                                   </p:stCondLst>
                                   <p:childTnLst>
-                                    <p:animMotion origin="layout" path="M 0 0 C 0.1216985 -0.02777778 0.1216985 -0.02777778 0.2433971 -0.05555556 E" pathEditMode="relative" ptsTypes="">
+                                    <p:animMotion origin="layout" path="M 0 0 C 0.1957942 0.0005659527 0.1957942 0.0005659527 0.3915884 0.001131905 E" pathEditMode="relative" ptsTypes="">
                                       <p:cBhvr>
                                         <p:cTn id="13" dur="500" fill="hold"/>
                                         <p:tgtEl>
@@ -4779,7 +4821,7 @@
                                     <p:cond delay="0"/>
                                   </p:stCondLst>
                                   <p:childTnLst>
-                                    <p:animMotion origin="layout" path="M 0 0 C 0.2317077 -0.1448653 0.2317077 -0.1448653 0.4634154 -0.2897306 E" pathEditMode="relative" ptsTypes="">
+                                    <p:animMotion origin="layout" path="M 0 0 C 0.3058034 -0.1165216 0.3058034 -0.1165216 0.6116068 -0.2330432 E" pathEditMode="relative" ptsTypes="">
                                       <p:cBhvr>
                                         <p:cTn id="15" dur="500" fill="hold"/>
                                         <p:tgtEl>
@@ -4871,13 +4913,56 @@
       </p:grpSpPr>
       <p:sp>
         <p:nvSpPr>
-          <p:cNvPr id="3" name="Chevron 2"/>
+          <p:cNvPr id="7" name="TextBox 6"/>
+          <p:cNvSpPr txBox="1"/>
+          <p:nvPr/>
+        </p:nvSpPr>
+        <p:spPr>
+          <a:xfrm>
+            <a:off x="633076" y="0"/>
+            <a:ext cx="3024524" cy="523220"/>
+          </a:xfrm>
+          <a:prstGeom prst="rect">
+            <a:avLst/>
+          </a:prstGeom>
+          <a:noFill/>
+        </p:spPr>
+        <p:txBody>
+          <a:bodyPr wrap="square" rtlCol="0">
+            <a:spAutoFit/>
+          </a:bodyPr>
+          <a:lstStyle/>
+          <a:p>
+            <a:pPr algn="r"/>
+            <a:r>
+              <a:rPr lang="en-US" sz="2800" b="1" dirty="0" smtClean="0">
+                <a:solidFill>
+                  <a:schemeClr val="accent6">
+                    <a:lumMod val="75000"/>
+                  </a:schemeClr>
+                </a:solidFill>
+              </a:rPr>
+              <a:t>Auto-animated</a:t>
+            </a:r>
+            <a:endParaRPr lang="en-US" sz="2800" b="1" dirty="0">
+              <a:solidFill>
+                <a:schemeClr val="accent6">
+                  <a:lumMod val="75000"/>
+                </a:schemeClr>
+              </a:solidFill>
+            </a:endParaRPr>
+          </a:p>
+        </p:txBody>
+      </p:sp>
+      <p:sp>
+        <p:nvSpPr>
+          <p:cNvPr id="8" name="arrow 1"/>
           <p:cNvSpPr/>
           <p:nvPr/>
         </p:nvSpPr>
         <p:spPr>
           <a:xfrm>
-            <a:off x="589873" y="1066800"/>
+            <a:off x="1131898" y="1222305"/>
             <a:ext cx="914400" cy="426720"/>
           </a:xfrm>
           <a:prstGeom prst="chevron">
@@ -4922,13 +5007,13 @@
       </p:sp>
       <p:sp>
         <p:nvSpPr>
-          <p:cNvPr id="14" name="Chevron 13"/>
+          <p:cNvPr id="9" name="arrow 2"/>
           <p:cNvSpPr/>
           <p:nvPr/>
         </p:nvSpPr>
         <p:spPr>
           <a:xfrm>
-            <a:off x="1294724" y="1066800"/>
+            <a:off x="1836749" y="1222305"/>
             <a:ext cx="914400" cy="426720"/>
           </a:xfrm>
           <a:prstGeom prst="chevron">
@@ -4973,13 +5058,13 @@
       </p:sp>
       <p:sp>
         <p:nvSpPr>
-          <p:cNvPr id="15" name="Chevron 14"/>
+          <p:cNvPr id="10" name="arrow 3"/>
           <p:cNvSpPr/>
           <p:nvPr/>
         </p:nvSpPr>
         <p:spPr>
           <a:xfrm>
-            <a:off x="1966633" y="1066800"/>
+            <a:off x="2508658" y="1222305"/>
             <a:ext cx="914400" cy="426720"/>
           </a:xfrm>
           <a:prstGeom prst="chevron">
@@ -5019,45 +5104,6 @@
           <a:p>
             <a:pPr algn="ctr"/>
             <a:endParaRPr lang="en-US" sz="1000" b="1"/>
-          </a:p>
-        </p:txBody>
-      </p:sp>
-      <p:sp>
-        <p:nvSpPr>
-          <p:cNvPr id="6" name="TextBox 5"/>
-          <p:cNvSpPr txBox="1"/>
-          <p:nvPr/>
-        </p:nvSpPr>
-        <p:spPr>
-          <a:xfrm>
-            <a:off x="633076" y="0"/>
-            <a:ext cx="3024524" cy="584775"/>
-          </a:xfrm>
-          <a:prstGeom prst="rect">
-            <a:avLst/>
-          </a:prstGeom>
-          <a:noFill/>
-        </p:spPr>
-        <p:txBody>
-          <a:bodyPr wrap="square" rtlCol="0">
-            <a:spAutoFit/>
-          </a:bodyPr>
-          <a:lstStyle/>
-          <a:p>
-            <a:pPr algn="r"/>
-            <a:r>
-              <a:rPr lang="en-US" sz="3200" b="1" dirty="0" smtClean="0">
-                <a:solidFill>
-                  <a:schemeClr val="bg1"/>
-                </a:solidFill>
-              </a:rPr>
-              <a:t>Auto-animated</a:t>
-            </a:r>
-            <a:endParaRPr lang="en-US" sz="3200" b="1" dirty="0">
-              <a:solidFill>
-                <a:schemeClr val="bg1"/>
-              </a:solidFill>
-            </a:endParaRPr>
           </a:p>
         </p:txBody>
       </p:sp>
@@ -5164,11 +5210,11 @@
   <p:clrMapOvr>
     <a:masterClrMapping/>
   </p:clrMapOvr>
-  <mc:AlternateContent xmlns:mc="http://schemas.openxmlformats.org/markup-compatibility/2006">
-    <mc:Choice xmlns:p14="http://schemas.microsoft.com/office/powerpoint/2010/main" Requires="p14">
+  <mc:AlternateContent xmlns:mc="http://schemas.openxmlformats.org/markup-compatibility/2006" xmlns:p14="http://schemas.microsoft.com/office/powerpoint/2010/main">
+    <mc:Choice Requires="p14">
       <p:transition spd="slow" p14:dur="2000"/>
     </mc:Choice>
-    <mc:Fallback>
+    <mc:Fallback xmlns="">
       <p:transition spd="slow"/>
     </mc:Fallback>
   </mc:AlternateContent>

</xml_diff>

<commit_message>
Issue 88: Reduce colors in landing page images Update Issue 88
</commit_message>
<xml_diff>
--- a/doc/Auto-animate gif.pptx
+++ b/doc/Auto-animate gif.pptx
@@ -294,7 +294,7 @@
           <a:p>
             <a:fld id="{1C243D36-5217-48BF-A097-7AA0FC8B35E5}" type="datetimeFigureOut">
               <a:rPr lang="en-US" smtClean="0"/>
-              <a:t>12/23/2013</a:t>
+              <a:t>12/27/2013</a:t>
             </a:fld>
             <a:endParaRPr lang="en-US"/>
           </a:p>
@@ -464,7 +464,7 @@
           <a:p>
             <a:fld id="{1C243D36-5217-48BF-A097-7AA0FC8B35E5}" type="datetimeFigureOut">
               <a:rPr lang="en-US" smtClean="0"/>
-              <a:t>12/23/2013</a:t>
+              <a:t>12/27/2013</a:t>
             </a:fld>
             <a:endParaRPr lang="en-US"/>
           </a:p>
@@ -644,7 +644,7 @@
           <a:p>
             <a:fld id="{1C243D36-5217-48BF-A097-7AA0FC8B35E5}" type="datetimeFigureOut">
               <a:rPr lang="en-US" smtClean="0"/>
-              <a:t>12/23/2013</a:t>
+              <a:t>12/27/2013</a:t>
             </a:fld>
             <a:endParaRPr lang="en-US"/>
           </a:p>
@@ -814,7 +814,7 @@
           <a:p>
             <a:fld id="{1C243D36-5217-48BF-A097-7AA0FC8B35E5}" type="datetimeFigureOut">
               <a:rPr lang="en-US" smtClean="0"/>
-              <a:t>12/23/2013</a:t>
+              <a:t>12/27/2013</a:t>
             </a:fld>
             <a:endParaRPr lang="en-US"/>
           </a:p>
@@ -1067,7 +1067,7 @@
           <a:p>
             <a:fld id="{1C243D36-5217-48BF-A097-7AA0FC8B35E5}" type="datetimeFigureOut">
               <a:rPr lang="en-US" smtClean="0"/>
-              <a:t>12/23/2013</a:t>
+              <a:t>12/27/2013</a:t>
             </a:fld>
             <a:endParaRPr lang="en-US"/>
           </a:p>
@@ -1355,7 +1355,7 @@
           <a:p>
             <a:fld id="{1C243D36-5217-48BF-A097-7AA0FC8B35E5}" type="datetimeFigureOut">
               <a:rPr lang="en-US" smtClean="0"/>
-              <a:t>12/23/2013</a:t>
+              <a:t>12/27/2013</a:t>
             </a:fld>
             <a:endParaRPr lang="en-US"/>
           </a:p>
@@ -1782,7 +1782,7 @@
           <a:p>
             <a:fld id="{1C243D36-5217-48BF-A097-7AA0FC8B35E5}" type="datetimeFigureOut">
               <a:rPr lang="en-US" smtClean="0"/>
-              <a:t>12/23/2013</a:t>
+              <a:t>12/27/2013</a:t>
             </a:fld>
             <a:endParaRPr lang="en-US"/>
           </a:p>
@@ -1900,7 +1900,7 @@
           <a:p>
             <a:fld id="{1C243D36-5217-48BF-A097-7AA0FC8B35E5}" type="datetimeFigureOut">
               <a:rPr lang="en-US" smtClean="0"/>
-              <a:t>12/23/2013</a:t>
+              <a:t>12/27/2013</a:t>
             </a:fld>
             <a:endParaRPr lang="en-US"/>
           </a:p>
@@ -1995,7 +1995,7 @@
           <a:p>
             <a:fld id="{1C243D36-5217-48BF-A097-7AA0FC8B35E5}" type="datetimeFigureOut">
               <a:rPr lang="en-US" smtClean="0"/>
-              <a:t>12/23/2013</a:t>
+              <a:t>12/27/2013</a:t>
             </a:fld>
             <a:endParaRPr lang="en-US"/>
           </a:p>
@@ -2272,7 +2272,7 @@
           <a:p>
             <a:fld id="{1C243D36-5217-48BF-A097-7AA0FC8B35E5}" type="datetimeFigureOut">
               <a:rPr lang="en-US" smtClean="0"/>
-              <a:t>12/23/2013</a:t>
+              <a:t>12/27/2013</a:t>
             </a:fld>
             <a:endParaRPr lang="en-US"/>
           </a:p>
@@ -2525,7 +2525,7 @@
           <a:p>
             <a:fld id="{1C243D36-5217-48BF-A097-7AA0FC8B35E5}" type="datetimeFigureOut">
               <a:rPr lang="en-US" smtClean="0"/>
-              <a:t>12/23/2013</a:t>
+              <a:t>12/27/2013</a:t>
             </a:fld>
             <a:endParaRPr lang="en-US"/>
           </a:p>
@@ -2741,7 +2741,7 @@
           <a:p>
             <a:fld id="{1C243D36-5217-48BF-A097-7AA0FC8B35E5}" type="datetimeFigureOut">
               <a:rPr lang="en-US" smtClean="0"/>
-              <a:t>12/23/2013</a:t>
+              <a:t>12/27/2013</a:t>
             </a:fld>
             <a:endParaRPr lang="en-US"/>
           </a:p>
@@ -3195,28 +3195,18 @@
           <a:p>
             <a:pPr algn="r"/>
             <a:r>
-              <a:rPr lang="en-US" sz="2800" b="1" dirty="0" smtClean="0">
+              <a:rPr lang="en-US" sz="2800" dirty="0" smtClean="0">
                 <a:solidFill>
-                  <a:schemeClr val="accent6">
+                  <a:schemeClr val="bg1">
                     <a:lumMod val="75000"/>
                   </a:schemeClr>
                 </a:solidFill>
               </a:rPr>
-              <a:t>Specify start </a:t>
-            </a:r>
-            <a:r>
-              <a:rPr lang="en-US" sz="2800" b="1" dirty="0" smtClean="0">
-                <a:solidFill>
-                  <a:schemeClr val="accent6">
-                    <a:lumMod val="75000"/>
-                  </a:schemeClr>
-                </a:solidFill>
-              </a:rPr>
-              <a:t>position</a:t>
-            </a:r>
-            <a:endParaRPr lang="en-US" sz="2800" b="1" dirty="0">
+              <a:t>Specify start position</a:t>
+            </a:r>
+            <a:endParaRPr lang="en-US" sz="2800" dirty="0">
               <a:solidFill>
-                <a:schemeClr val="accent6">
+                <a:schemeClr val="bg1">
                   <a:lumMod val="75000"/>
                 </a:schemeClr>
               </a:solidFill>
@@ -3767,36 +3757,26 @@
           <a:bodyPr wrap="square" rtlCol="0">
             <a:spAutoFit/>
           </a:bodyPr>
-          <a:lstStyle/>
-          <a:p>
-            <a:pPr algn="r"/>
-            <a:r>
-              <a:rPr lang="en-US" sz="2800" b="1" dirty="0" smtClean="0">
+          <a:lstStyle>
+            <a:defPPr>
+              <a:defRPr lang="en-US"/>
+            </a:defPPr>
+            <a:lvl1pPr algn="r">
+              <a:defRPr sz="2800">
                 <a:solidFill>
-                  <a:schemeClr val="accent6">
+                  <a:schemeClr val="bg1">
                     <a:lumMod val="75000"/>
                   </a:schemeClr>
                 </a:solidFill>
-              </a:rPr>
-              <a:t>Specify end </a:t>
-            </a:r>
-            <a:r>
-              <a:rPr lang="en-US" sz="2800" b="1" dirty="0" smtClean="0">
-                <a:solidFill>
-                  <a:schemeClr val="accent6">
-                    <a:lumMod val="75000"/>
-                  </a:schemeClr>
-                </a:solidFill>
-              </a:rPr>
-              <a:t>position</a:t>
-            </a:r>
-            <a:endParaRPr lang="en-US" sz="2800" b="1" dirty="0">
-              <a:solidFill>
-                <a:schemeClr val="accent6">
-                  <a:lumMod val="75000"/>
-                </a:schemeClr>
-              </a:solidFill>
-            </a:endParaRPr>
+              </a:defRPr>
+            </a:lvl1pPr>
+          </a:lstStyle>
+          <a:p>
+            <a:r>
+              <a:rPr lang="en-US" dirty="0"/>
+              <a:t>Specify end position</a:t>
+            </a:r>
+            <a:endParaRPr lang="en-US" dirty="0"/>
           </a:p>
         </p:txBody>
       </p:sp>
@@ -4378,26 +4358,26 @@
           <a:bodyPr wrap="square" rtlCol="0">
             <a:spAutoFit/>
           </a:bodyPr>
-          <a:lstStyle/>
-          <a:p>
-            <a:pPr algn="r"/>
-            <a:r>
-              <a:rPr lang="en-US" sz="2800" b="1" dirty="0" smtClean="0">
+          <a:lstStyle>
+            <a:defPPr>
+              <a:defRPr lang="en-US"/>
+            </a:defPPr>
+            <a:lvl1pPr algn="r">
+              <a:defRPr sz="2800">
                 <a:solidFill>
-                  <a:schemeClr val="accent6">
+                  <a:schemeClr val="bg1">
                     <a:lumMod val="75000"/>
                   </a:schemeClr>
                 </a:solidFill>
-              </a:rPr>
+              </a:defRPr>
+            </a:lvl1pPr>
+          </a:lstStyle>
+          <a:p>
+            <a:r>
+              <a:rPr lang="en-US" dirty="0"/>
               <a:t>Auto-animated</a:t>
             </a:r>
-            <a:endParaRPr lang="en-US" sz="2800" b="1" dirty="0">
-              <a:solidFill>
-                <a:schemeClr val="accent6">
-                  <a:lumMod val="75000"/>
-                </a:schemeClr>
-              </a:solidFill>
-            </a:endParaRPr>
+            <a:endParaRPr lang="en-US" dirty="0"/>
           </a:p>
         </p:txBody>
       </p:sp>
@@ -4623,26 +4603,26 @@
           <a:bodyPr wrap="square" rtlCol="0">
             <a:spAutoFit/>
           </a:bodyPr>
-          <a:lstStyle/>
-          <a:p>
-            <a:pPr algn="r"/>
-            <a:r>
-              <a:rPr lang="en-US" sz="2800" b="1" dirty="0" smtClean="0">
+          <a:lstStyle>
+            <a:defPPr>
+              <a:defRPr lang="en-US"/>
+            </a:defPPr>
+            <a:lvl1pPr algn="r">
+              <a:defRPr sz="2800">
                 <a:solidFill>
-                  <a:schemeClr val="accent6">
+                  <a:schemeClr val="bg1">
                     <a:lumMod val="75000"/>
                   </a:schemeClr>
                 </a:solidFill>
-              </a:rPr>
+              </a:defRPr>
+            </a:lvl1pPr>
+          </a:lstStyle>
+          <a:p>
+            <a:r>
+              <a:rPr lang="en-US" dirty="0"/>
               <a:t>Auto-animated</a:t>
             </a:r>
-            <a:endParaRPr lang="en-US" sz="2800" b="1" dirty="0">
-              <a:solidFill>
-                <a:schemeClr val="accent6">
-                  <a:lumMod val="75000"/>
-                </a:schemeClr>
-              </a:solidFill>
-            </a:endParaRPr>
+            <a:endParaRPr lang="en-US" dirty="0"/>
           </a:p>
         </p:txBody>
       </p:sp>
@@ -4686,11 +4666,11 @@
   <p:clrMapOvr>
     <a:masterClrMapping/>
   </p:clrMapOvr>
-  <mc:AlternateContent xmlns:mc="http://schemas.openxmlformats.org/markup-compatibility/2006">
-    <mc:Choice xmlns:p14="http://schemas.microsoft.com/office/powerpoint/2010/main" Requires="p14">
+  <mc:AlternateContent xmlns:mc="http://schemas.openxmlformats.org/markup-compatibility/2006" xmlns:p14="http://schemas.microsoft.com/office/powerpoint/2010/main">
+    <mc:Choice Requires="p14">
       <p:transition spd="med" p14:dur="700" advClick="0" advTm="0"/>
     </mc:Choice>
-    <mc:Fallback>
+    <mc:Fallback xmlns="">
       <p:transition spd="med" advClick="0" advTm="0"/>
     </mc:Fallback>
   </mc:AlternateContent>
@@ -4931,26 +4911,26 @@
           <a:bodyPr wrap="square" rtlCol="0">
             <a:spAutoFit/>
           </a:bodyPr>
-          <a:lstStyle/>
-          <a:p>
-            <a:pPr algn="r"/>
-            <a:r>
-              <a:rPr lang="en-US" sz="2800" b="1" dirty="0" smtClean="0">
+          <a:lstStyle>
+            <a:defPPr>
+              <a:defRPr lang="en-US"/>
+            </a:defPPr>
+            <a:lvl1pPr algn="r">
+              <a:defRPr sz="2800">
                 <a:solidFill>
-                  <a:schemeClr val="accent6">
+                  <a:schemeClr val="bg1">
                     <a:lumMod val="75000"/>
                   </a:schemeClr>
                 </a:solidFill>
-              </a:rPr>
+              </a:defRPr>
+            </a:lvl1pPr>
+          </a:lstStyle>
+          <a:p>
+            <a:r>
+              <a:rPr lang="en-US" dirty="0"/>
               <a:t>Auto-animated</a:t>
             </a:r>
-            <a:endParaRPr lang="en-US" sz="2800" b="1" dirty="0">
-              <a:solidFill>
-                <a:schemeClr val="accent6">
-                  <a:lumMod val="75000"/>
-                </a:schemeClr>
-              </a:solidFill>
-            </a:endParaRPr>
+            <a:endParaRPr lang="en-US" dirty="0"/>
           </a:p>
         </p:txBody>
       </p:sp>
@@ -5117,11 +5097,11 @@
   <p:clrMapOvr>
     <a:masterClrMapping/>
   </p:clrMapOvr>
-  <mc:AlternateContent xmlns:mc="http://schemas.openxmlformats.org/markup-compatibility/2006">
-    <mc:Choice xmlns:p14="http://schemas.microsoft.com/office/powerpoint/2010/main" Requires="p14">
+  <mc:AlternateContent xmlns:mc="http://schemas.openxmlformats.org/markup-compatibility/2006" xmlns:p14="http://schemas.microsoft.com/office/powerpoint/2010/main">
+    <mc:Choice Requires="p14">
       <p:transition p14:dur="0" advClick="0" advTm="1000"/>
     </mc:Choice>
-    <mc:Fallback>
+    <mc:Fallback xmlns="">
       <p:transition advClick="0" advTm="1000"/>
     </mc:Fallback>
   </mc:AlternateContent>

</xml_diff>